<commit_message>
Update Clean Code Chapter 3 presentation
Complete the chapter
</commit_message>
<xml_diff>
--- a/Clean Code - Chapter 3.pptx
+++ b/Clean Code - Chapter 3.pptx
@@ -33,6 +33,10 @@
     <p:sldId id="281" r:id="rId30"/>
     <p:sldId id="282" r:id="rId31"/>
     <p:sldId id="283" r:id="rId32"/>
+    <p:sldId id="284" r:id="rId33"/>
+    <p:sldId id="285" r:id="rId34"/>
+    <p:sldId id="286" r:id="rId35"/>
+    <p:sldId id="287" r:id="rId36"/>
   </p:sldIdLst>
   <p:sldSz cx="12192000" cy="6858000"/>
   <p:notesSz cx="6858000" cy="9144000"/>
@@ -294,7 +298,7 @@
           <a:p>
             <a:fld id="{82EDB8D0-98ED-4B86-9D5F-E61ADC70144D}" type="datetimeFigureOut">
               <a:rPr lang="en-US" smtClean="0"/>
-              <a:t>7/1/2025</a:t>
+              <a:t>03-Jul-25</a:t>
             </a:fld>
             <a:endParaRPr lang="en-US" dirty="0"/>
           </a:p>
@@ -709,7 +713,7 @@
           <a:p>
             <a:fld id="{82EDB8D0-98ED-4B86-9D5F-E61ADC70144D}" type="datetimeFigureOut">
               <a:rPr lang="en-US" smtClean="0"/>
-              <a:t>7/1/2025</a:t>
+              <a:t>03-Jul-25</a:t>
             </a:fld>
             <a:endParaRPr lang="en-US"/>
           </a:p>
@@ -1201,7 +1205,7 @@
           <a:p>
             <a:fld id="{82EDB8D0-98ED-4B86-9D5F-E61ADC70144D}" type="datetimeFigureOut">
               <a:rPr lang="en-US" smtClean="0"/>
-              <a:t>7/1/2025</a:t>
+              <a:t>03-Jul-25</a:t>
             </a:fld>
             <a:endParaRPr lang="en-US"/>
           </a:p>
@@ -1688,7 +1692,7 @@
           <a:p>
             <a:fld id="{82EDB8D0-98ED-4B86-9D5F-E61ADC70144D}" type="datetimeFigureOut">
               <a:rPr lang="en-US" smtClean="0"/>
-              <a:t>7/1/2025</a:t>
+              <a:t>03-Jul-25</a:t>
             </a:fld>
             <a:endParaRPr lang="en-US" dirty="0"/>
           </a:p>
@@ -2457,7 +2461,7 @@
           <a:p>
             <a:fld id="{82EDB8D0-98ED-4B86-9D5F-E61ADC70144D}" type="datetimeFigureOut">
               <a:rPr lang="en-US" smtClean="0"/>
-              <a:t>7/1/2025</a:t>
+              <a:t>03-Jul-25</a:t>
             </a:fld>
             <a:endParaRPr lang="en-US"/>
           </a:p>
@@ -2939,7 +2943,7 @@
           <a:p>
             <a:fld id="{82EDB8D0-98ED-4B86-9D5F-E61ADC70144D}" type="datetimeFigureOut">
               <a:rPr lang="en-US" smtClean="0"/>
-              <a:t>7/1/2025</a:t>
+              <a:t>03-Jul-25</a:t>
             </a:fld>
             <a:endParaRPr lang="en-US"/>
           </a:p>
@@ -3635,7 +3639,7 @@
           <a:p>
             <a:fld id="{82EDB8D0-98ED-4B86-9D5F-E61ADC70144D}" type="datetimeFigureOut">
               <a:rPr lang="en-US" smtClean="0"/>
-              <a:t>7/1/2025</a:t>
+              <a:t>03-Jul-25</a:t>
             </a:fld>
             <a:endParaRPr lang="en-US"/>
           </a:p>
@@ -4060,7 +4064,7 @@
           <a:p>
             <a:fld id="{82EDB8D0-98ED-4B86-9D5F-E61ADC70144D}" type="datetimeFigureOut">
               <a:rPr lang="en-US" smtClean="0"/>
-              <a:t>7/1/2025</a:t>
+              <a:t>03-Jul-25</a:t>
             </a:fld>
             <a:endParaRPr lang="en-US"/>
           </a:p>
@@ -4457,7 +4461,7 @@
           <a:p>
             <a:fld id="{82EDB8D0-98ED-4B86-9D5F-E61ADC70144D}" type="datetimeFigureOut">
               <a:rPr lang="en-US" smtClean="0"/>
-              <a:t>7/1/2025</a:t>
+              <a:t>03-Jul-25</a:t>
             </a:fld>
             <a:endParaRPr lang="en-US"/>
           </a:p>
@@ -5052,7 +5056,7 @@
           <a:p>
             <a:fld id="{82EDB8D0-98ED-4B86-9D5F-E61ADC70144D}" type="datetimeFigureOut">
               <a:rPr lang="en-US" smtClean="0"/>
-              <a:t>7/1/2025</a:t>
+              <a:t>03-Jul-25</a:t>
             </a:fld>
             <a:endParaRPr lang="en-US"/>
           </a:p>
@@ -5627,7 +5631,7 @@
           <a:p>
             <a:fld id="{82EDB8D0-98ED-4B86-9D5F-E61ADC70144D}" type="datetimeFigureOut">
               <a:rPr lang="en-US" smtClean="0"/>
-              <a:t>7/1/2025</a:t>
+              <a:t>03-Jul-25</a:t>
             </a:fld>
             <a:endParaRPr lang="en-US"/>
           </a:p>
@@ -6154,7 +6158,7 @@
             <a:fld id="{82EDB8D0-98ED-4B86-9D5F-E61ADC70144D}" type="datetimeFigureOut">
               <a:rPr lang="en-US" smtClean="0"/>
               <a:pPr/>
-              <a:t>7/1/2025</a:t>
+              <a:t>03-Jul-25</a:t>
             </a:fld>
             <a:endParaRPr lang="en-US" dirty="0"/>
           </a:p>
@@ -9888,6 +9892,110 @@
 </p:sld>
 </file>
 
+<file path=ppt/slides/slide29.xml><?xml version="1.0" encoding="utf-8"?>
+<p:sld xmlns:a="http://schemas.openxmlformats.org/drawingml/2006/main" xmlns:r="http://schemas.openxmlformats.org/officeDocument/2006/relationships" xmlns:p="http://schemas.openxmlformats.org/presentationml/2006/main">
+  <p:cSld>
+    <p:spTree>
+      <p:nvGrpSpPr>
+        <p:cNvPr id="1" name=""/>
+        <p:cNvGrpSpPr/>
+        <p:nvPr/>
+      </p:nvGrpSpPr>
+      <p:grpSpPr>
+        <a:xfrm>
+          <a:off x="0" y="0"/>
+          <a:ext cx="0" cy="0"/>
+          <a:chOff x="0" y="0"/>
+          <a:chExt cx="0" cy="0"/>
+        </a:xfrm>
+      </p:grpSpPr>
+      <p:sp>
+        <p:nvSpPr>
+          <p:cNvPr id="2" name="Title 1">
+            <a:extLst>
+              <a:ext uri="{FF2B5EF4-FFF2-40B4-BE49-F238E27FC236}">
+                <a16:creationId xmlns:a16="http://schemas.microsoft.com/office/drawing/2014/main" id="{01BC48FB-D5CB-7E14-6C0C-4F41060CDE04}"/>
+              </a:ext>
+            </a:extLst>
+          </p:cNvPr>
+          <p:cNvSpPr>
+            <a:spLocks noGrp="1"/>
+          </p:cNvSpPr>
+          <p:nvPr>
+            <p:ph type="title"/>
+          </p:nvPr>
+        </p:nvSpPr>
+        <p:spPr/>
+        <p:txBody>
+          <a:bodyPr/>
+          <a:lstStyle/>
+          <a:p>
+            <a:r>
+              <a:rPr lang="en-US" dirty="0"/>
+              <a:t>Don’t Repeat Yourself</a:t>
+            </a:r>
+          </a:p>
+        </p:txBody>
+      </p:sp>
+      <p:sp>
+        <p:nvSpPr>
+          <p:cNvPr id="3" name="Content Placeholder 2">
+            <a:extLst>
+              <a:ext uri="{FF2B5EF4-FFF2-40B4-BE49-F238E27FC236}">
+                <a16:creationId xmlns:a16="http://schemas.microsoft.com/office/drawing/2014/main" id="{30440BA6-D5F2-78AB-9405-049512E82017}"/>
+              </a:ext>
+            </a:extLst>
+          </p:cNvPr>
+          <p:cNvSpPr>
+            <a:spLocks noGrp="1"/>
+          </p:cNvSpPr>
+          <p:nvPr>
+            <p:ph idx="1"/>
+          </p:nvPr>
+        </p:nvSpPr>
+        <p:spPr/>
+        <p:txBody>
+          <a:bodyPr/>
+          <a:lstStyle/>
+          <a:p>
+            <a:r>
+              <a:rPr lang="en-US" dirty="0"/>
+              <a:t>Duplication may be the root of all evil in software.</a:t>
+            </a:r>
+          </a:p>
+          <a:p>
+            <a:endParaRPr lang="en-US" dirty="0"/>
+          </a:p>
+          <a:p>
+            <a:r>
+              <a:rPr lang="en-US" dirty="0"/>
+              <a:t>Structured programming, Aspect Oriented Programming, Component Oriented Programming, are all, in part, strategies for eliminating duplication.</a:t>
+            </a:r>
+          </a:p>
+          <a:p>
+            <a:endParaRPr lang="en-US" dirty="0"/>
+          </a:p>
+          <a:p>
+            <a:r>
+              <a:rPr lang="en-US" dirty="0"/>
+              <a:t>Innovations in software development have been an ongoing attempt to eliminate duplication from our source code.</a:t>
+            </a:r>
+          </a:p>
+        </p:txBody>
+      </p:sp>
+    </p:spTree>
+    <p:extLst>
+      <p:ext uri="{BB962C8B-B14F-4D97-AF65-F5344CB8AC3E}">
+        <p14:creationId xmlns:p14="http://schemas.microsoft.com/office/powerpoint/2010/main" val="2623346202"/>
+      </p:ext>
+    </p:extLst>
+  </p:cSld>
+  <p:clrMapOvr>
+    <a:masterClrMapping/>
+  </p:clrMapOvr>
+</p:sld>
+</file>
+
 <file path=ppt/slides/slide3.xml><?xml version="1.0" encoding="utf-8"?>
 <p:sld xmlns:a="http://schemas.openxmlformats.org/drawingml/2006/main" xmlns:r="http://schemas.openxmlformats.org/officeDocument/2006/relationships" xmlns:p="http://schemas.openxmlformats.org/presentationml/2006/main">
   <p:cSld>
@@ -10103,6 +10211,365 @@
     <p:extLst>
       <p:ext uri="{BB962C8B-B14F-4D97-AF65-F5344CB8AC3E}">
         <p14:creationId xmlns:p14="http://schemas.microsoft.com/office/powerpoint/2010/main" val="1714858037"/>
+      </p:ext>
+    </p:extLst>
+  </p:cSld>
+  <p:clrMapOvr>
+    <a:masterClrMapping/>
+  </p:clrMapOvr>
+</p:sld>
+</file>
+
+<file path=ppt/slides/slide30.xml><?xml version="1.0" encoding="utf-8"?>
+<p:sld xmlns:a="http://schemas.openxmlformats.org/drawingml/2006/main" xmlns:r="http://schemas.openxmlformats.org/officeDocument/2006/relationships" xmlns:p="http://schemas.openxmlformats.org/presentationml/2006/main">
+  <p:cSld>
+    <p:spTree>
+      <p:nvGrpSpPr>
+        <p:cNvPr id="1" name=""/>
+        <p:cNvGrpSpPr/>
+        <p:nvPr/>
+      </p:nvGrpSpPr>
+      <p:grpSpPr>
+        <a:xfrm>
+          <a:off x="0" y="0"/>
+          <a:ext cx="0" cy="0"/>
+          <a:chOff x="0" y="0"/>
+          <a:chExt cx="0" cy="0"/>
+        </a:xfrm>
+      </p:grpSpPr>
+      <p:sp>
+        <p:nvSpPr>
+          <p:cNvPr id="2" name="Title 1">
+            <a:extLst>
+              <a:ext uri="{FF2B5EF4-FFF2-40B4-BE49-F238E27FC236}">
+                <a16:creationId xmlns:a16="http://schemas.microsoft.com/office/drawing/2014/main" id="{61C81C8F-F8A9-D7BA-4F13-DBB35E4C5BCD}"/>
+              </a:ext>
+            </a:extLst>
+          </p:cNvPr>
+          <p:cNvSpPr>
+            <a:spLocks noGrp="1"/>
+          </p:cNvSpPr>
+          <p:nvPr>
+            <p:ph type="title"/>
+          </p:nvPr>
+        </p:nvSpPr>
+        <p:spPr/>
+        <p:txBody>
+          <a:bodyPr/>
+          <a:lstStyle/>
+          <a:p>
+            <a:r>
+              <a:rPr lang="en-US" dirty="0"/>
+              <a:t>Structured Programming</a:t>
+            </a:r>
+          </a:p>
+        </p:txBody>
+      </p:sp>
+      <p:sp>
+        <p:nvSpPr>
+          <p:cNvPr id="3" name="Content Placeholder 2">
+            <a:extLst>
+              <a:ext uri="{FF2B5EF4-FFF2-40B4-BE49-F238E27FC236}">
+                <a16:creationId xmlns:a16="http://schemas.microsoft.com/office/drawing/2014/main" id="{71DF85EB-CF37-9568-7E35-52EDA751017A}"/>
+              </a:ext>
+            </a:extLst>
+          </p:cNvPr>
+          <p:cNvSpPr>
+            <a:spLocks noGrp="1"/>
+          </p:cNvSpPr>
+          <p:nvPr>
+            <p:ph idx="1"/>
+          </p:nvPr>
+        </p:nvSpPr>
+        <p:spPr/>
+        <p:txBody>
+          <a:bodyPr>
+            <a:normAutofit lnSpcReduction="10000"/>
+          </a:bodyPr>
+          <a:lstStyle/>
+          <a:p>
+            <a:r>
+              <a:rPr lang="en-US" dirty="0" err="1"/>
+              <a:t>Edsger</a:t>
+            </a:r>
+            <a:r>
+              <a:rPr lang="en-US" dirty="0"/>
+              <a:t> Dijkstra said:</a:t>
+            </a:r>
+          </a:p>
+          <a:p>
+            <a:pPr lvl="1"/>
+            <a:r>
+              <a:rPr lang="en-US" dirty="0"/>
+              <a:t>Every function, and every block within a function, should have one entry and one exit.</a:t>
+            </a:r>
+          </a:p>
+          <a:p>
+            <a:pPr marL="457200" lvl="1" indent="0">
+              <a:buNone/>
+            </a:pPr>
+            <a:endParaRPr lang="en-US" dirty="0"/>
+          </a:p>
+          <a:p>
+            <a:r>
+              <a:rPr lang="en-US" dirty="0"/>
+              <a:t>Following this rule means that there should only be one </a:t>
+            </a:r>
+            <a:r>
+              <a:rPr lang="en-US" sz="2400" dirty="0"/>
+              <a:t>return</a:t>
+            </a:r>
+            <a:r>
+              <a:rPr lang="en-US" dirty="0"/>
+              <a:t> statement in a function, no </a:t>
+            </a:r>
+            <a:r>
+              <a:rPr lang="en-US" sz="2400" dirty="0"/>
+              <a:t>break</a:t>
+            </a:r>
+            <a:r>
+              <a:rPr lang="en-US" dirty="0"/>
+              <a:t> or </a:t>
+            </a:r>
+            <a:r>
+              <a:rPr lang="en-US" sz="2400" dirty="0"/>
+              <a:t>continue</a:t>
+            </a:r>
+            <a:r>
+              <a:rPr lang="en-US" dirty="0"/>
+              <a:t> statements in a loop, and never, </a:t>
+            </a:r>
+            <a:r>
+              <a:rPr lang="en-US" i="1" dirty="0"/>
+              <a:t>ever</a:t>
+            </a:r>
+            <a:r>
+              <a:rPr lang="en-US" dirty="0"/>
+              <a:t>, any </a:t>
+            </a:r>
+            <a:r>
+              <a:rPr lang="en-US" sz="2400" dirty="0" err="1"/>
+              <a:t>goto</a:t>
+            </a:r>
+            <a:r>
+              <a:rPr lang="en-US" dirty="0"/>
+              <a:t> statement.</a:t>
+            </a:r>
+          </a:p>
+          <a:p>
+            <a:endParaRPr lang="en-US" dirty="0"/>
+          </a:p>
+          <a:p>
+            <a:r>
+              <a:rPr lang="en-US" dirty="0"/>
+              <a:t>These rules provide significant benefit only in large functions.</a:t>
+            </a:r>
+          </a:p>
+        </p:txBody>
+      </p:sp>
+    </p:spTree>
+    <p:extLst>
+      <p:ext uri="{BB962C8B-B14F-4D97-AF65-F5344CB8AC3E}">
+        <p14:creationId xmlns:p14="http://schemas.microsoft.com/office/powerpoint/2010/main" val="2960751830"/>
+      </p:ext>
+    </p:extLst>
+  </p:cSld>
+  <p:clrMapOvr>
+    <a:masterClrMapping/>
+  </p:clrMapOvr>
+</p:sld>
+</file>
+
+<file path=ppt/slides/slide31.xml><?xml version="1.0" encoding="utf-8"?>
+<p:sld xmlns:a="http://schemas.openxmlformats.org/drawingml/2006/main" xmlns:r="http://schemas.openxmlformats.org/officeDocument/2006/relationships" xmlns:p="http://schemas.openxmlformats.org/presentationml/2006/main">
+  <p:cSld>
+    <p:spTree>
+      <p:nvGrpSpPr>
+        <p:cNvPr id="1" name=""/>
+        <p:cNvGrpSpPr/>
+        <p:nvPr/>
+      </p:nvGrpSpPr>
+      <p:grpSpPr>
+        <a:xfrm>
+          <a:off x="0" y="0"/>
+          <a:ext cx="0" cy="0"/>
+          <a:chOff x="0" y="0"/>
+          <a:chExt cx="0" cy="0"/>
+        </a:xfrm>
+      </p:grpSpPr>
+      <p:sp>
+        <p:nvSpPr>
+          <p:cNvPr id="2" name="Title 1">
+            <a:extLst>
+              <a:ext uri="{FF2B5EF4-FFF2-40B4-BE49-F238E27FC236}">
+                <a16:creationId xmlns:a16="http://schemas.microsoft.com/office/drawing/2014/main" id="{0152CFAC-652C-640A-A158-DD2D86B39F53}"/>
+              </a:ext>
+            </a:extLst>
+          </p:cNvPr>
+          <p:cNvSpPr>
+            <a:spLocks noGrp="1"/>
+          </p:cNvSpPr>
+          <p:nvPr>
+            <p:ph type="title"/>
+          </p:nvPr>
+        </p:nvSpPr>
+        <p:spPr/>
+        <p:txBody>
+          <a:bodyPr/>
+          <a:lstStyle/>
+          <a:p>
+            <a:r>
+              <a:rPr lang="en-US" dirty="0"/>
+              <a:t>How Do You Write Functions Like This?</a:t>
+            </a:r>
+          </a:p>
+        </p:txBody>
+      </p:sp>
+      <p:sp>
+        <p:nvSpPr>
+          <p:cNvPr id="3" name="Content Placeholder 2">
+            <a:extLst>
+              <a:ext uri="{FF2B5EF4-FFF2-40B4-BE49-F238E27FC236}">
+                <a16:creationId xmlns:a16="http://schemas.microsoft.com/office/drawing/2014/main" id="{6C207B0C-D63C-34D2-F952-212B3F6FB3E7}"/>
+              </a:ext>
+            </a:extLst>
+          </p:cNvPr>
+          <p:cNvSpPr>
+            <a:spLocks noGrp="1"/>
+          </p:cNvSpPr>
+          <p:nvPr>
+            <p:ph idx="1"/>
+          </p:nvPr>
+        </p:nvSpPr>
+        <p:spPr/>
+        <p:txBody>
+          <a:bodyPr/>
+          <a:lstStyle/>
+          <a:p>
+            <a:endParaRPr lang="en-US" dirty="0"/>
+          </a:p>
+          <a:p>
+            <a:r>
+              <a:rPr lang="en-US" dirty="0"/>
+              <a:t>Writing software is a lot like writing articles, the first draft is often messy and needs refining.</a:t>
+            </a:r>
+          </a:p>
+          <a:p>
+            <a:r>
+              <a:rPr lang="en-US" dirty="0"/>
+              <a:t>Initial code tends to be long, complex, and disorganized, but unit tests ensure it works.</a:t>
+            </a:r>
+          </a:p>
+          <a:p>
+            <a:r>
+              <a:rPr lang="en-US" dirty="0"/>
+              <a:t>Through continuous refactoring “splitting out functions, changing names, eliminating duplication”, the code becomes clean, structured, and maintainable.</a:t>
+            </a:r>
+          </a:p>
+        </p:txBody>
+      </p:sp>
+    </p:spTree>
+    <p:extLst>
+      <p:ext uri="{BB962C8B-B14F-4D97-AF65-F5344CB8AC3E}">
+        <p14:creationId xmlns:p14="http://schemas.microsoft.com/office/powerpoint/2010/main" val="2776459870"/>
+      </p:ext>
+    </p:extLst>
+  </p:cSld>
+  <p:clrMapOvr>
+    <a:masterClrMapping/>
+  </p:clrMapOvr>
+</p:sld>
+</file>
+
+<file path=ppt/slides/slide32.xml><?xml version="1.0" encoding="utf-8"?>
+<p:sld xmlns:a="http://schemas.openxmlformats.org/drawingml/2006/main" xmlns:r="http://schemas.openxmlformats.org/officeDocument/2006/relationships" xmlns:p="http://schemas.openxmlformats.org/presentationml/2006/main">
+  <p:cSld>
+    <p:spTree>
+      <p:nvGrpSpPr>
+        <p:cNvPr id="1" name=""/>
+        <p:cNvGrpSpPr/>
+        <p:nvPr/>
+      </p:nvGrpSpPr>
+      <p:grpSpPr>
+        <a:xfrm>
+          <a:off x="0" y="0"/>
+          <a:ext cx="0" cy="0"/>
+          <a:chOff x="0" y="0"/>
+          <a:chExt cx="0" cy="0"/>
+        </a:xfrm>
+      </p:grpSpPr>
+      <p:sp>
+        <p:nvSpPr>
+          <p:cNvPr id="2" name="Title 1">
+            <a:extLst>
+              <a:ext uri="{FF2B5EF4-FFF2-40B4-BE49-F238E27FC236}">
+                <a16:creationId xmlns:a16="http://schemas.microsoft.com/office/drawing/2014/main" id="{C1C61FC7-CB71-DC5B-A260-CF5DE78C9A61}"/>
+              </a:ext>
+            </a:extLst>
+          </p:cNvPr>
+          <p:cNvSpPr>
+            <a:spLocks noGrp="1"/>
+          </p:cNvSpPr>
+          <p:nvPr>
+            <p:ph type="title"/>
+          </p:nvPr>
+        </p:nvSpPr>
+        <p:spPr/>
+        <p:txBody>
+          <a:bodyPr/>
+          <a:lstStyle/>
+          <a:p>
+            <a:r>
+              <a:rPr lang="en-US" dirty="0"/>
+              <a:t>Conclusion</a:t>
+            </a:r>
+          </a:p>
+        </p:txBody>
+      </p:sp>
+      <p:sp>
+        <p:nvSpPr>
+          <p:cNvPr id="3" name="Content Placeholder 2">
+            <a:extLst>
+              <a:ext uri="{FF2B5EF4-FFF2-40B4-BE49-F238E27FC236}">
+                <a16:creationId xmlns:a16="http://schemas.microsoft.com/office/drawing/2014/main" id="{BB804EE0-980A-2CEF-BEAA-20799C023E60}"/>
+              </a:ext>
+            </a:extLst>
+          </p:cNvPr>
+          <p:cNvSpPr>
+            <a:spLocks noGrp="1"/>
+          </p:cNvSpPr>
+          <p:nvPr>
+            <p:ph idx="1"/>
+          </p:nvPr>
+        </p:nvSpPr>
+        <p:spPr/>
+        <p:txBody>
+          <a:bodyPr/>
+          <a:lstStyle/>
+          <a:p>
+            <a:r>
+              <a:rPr lang="en-US" dirty="0"/>
+              <a:t>Every system is built using a domain-specific language created by its programmers, where functions act as verbs and classes as nouns.</a:t>
+            </a:r>
+          </a:p>
+          <a:p>
+            <a:r>
+              <a:rPr lang="en-US" dirty="0"/>
+              <a:t>Master programmers treat systems as stories, designing expressive languages within their code to clearly communicate that story.</a:t>
+            </a:r>
+          </a:p>
+          <a:p>
+            <a:r>
+              <a:rPr lang="en-US" dirty="0"/>
+              <a:t>Writing good functions isn’t just about structure and naming – it’s about crafting a coherent language that tells the system story clearly.</a:t>
+            </a:r>
+          </a:p>
+        </p:txBody>
+      </p:sp>
+    </p:spTree>
+    <p:extLst>
+      <p:ext uri="{BB962C8B-B14F-4D97-AF65-F5344CB8AC3E}">
+        <p14:creationId xmlns:p14="http://schemas.microsoft.com/office/powerpoint/2010/main" val="3028181648"/>
       </p:ext>
     </p:extLst>
   </p:cSld>
@@ -11095,12 +11562,6 @@
 </file>
 
 <file path=customXml/item2.xml><?xml version="1.0" encoding="utf-8"?>
-<p:properties xmlns:p="http://schemas.microsoft.com/office/2006/metadata/properties" xmlns:xsi="http://www.w3.org/2001/XMLSchema-instance" xmlns:pc="http://schemas.microsoft.com/office/infopath/2007/PartnerControls">
-  <documentManagement/>
-</p:properties>
-</file>
-
-<file path=customXml/item3.xml><?xml version="1.0" encoding="utf-8"?>
 <ct:contentTypeSchema xmlns:ct="http://schemas.microsoft.com/office/2006/metadata/contentType" xmlns:ma="http://schemas.microsoft.com/office/2006/metadata/properties/metaAttributes" ct:_="" ma:_="" ma:contentTypeName="Document" ma:contentTypeID="0x01010047463583D1F9EE4C8149E915E8E3E199" ma:contentTypeVersion="7" ma:contentTypeDescription="Create a new document." ma:contentTypeScope="" ma:versionID="726a79e056cbbccfc432ba09713fffd4">
   <xsd:schema xmlns:xsd="http://www.w3.org/2001/XMLSchema" xmlns:xs="http://www.w3.org/2001/XMLSchema" xmlns:p="http://schemas.microsoft.com/office/2006/metadata/properties" xmlns:ns3="4cc12f37-b467-4376-9c87-c6a2b5099af4" targetNamespace="http://schemas.microsoft.com/office/2006/metadata/properties" ma:root="true" ma:fieldsID="0e59ef1b2228204bed50bbb282f18d3e" ns3:_="">
     <xsd:import namespace="4cc12f37-b467-4376-9c87-c6a2b5099af4"/>
@@ -11264,6 +11725,12 @@
 </ct:contentTypeSchema>
 </file>
 
+<file path=customXml/item3.xml><?xml version="1.0" encoding="utf-8"?>
+<p:properties xmlns:p="http://schemas.microsoft.com/office/2006/metadata/properties" xmlns:xsi="http://www.w3.org/2001/XMLSchema-instance" xmlns:pc="http://schemas.microsoft.com/office/infopath/2007/PartnerControls">
+  <documentManagement/>
+</p:properties>
+</file>
+
 <file path=customXml/itemProps1.xml><?xml version="1.0" encoding="utf-8"?>
 <ds:datastoreItem xmlns:ds="http://schemas.openxmlformats.org/officeDocument/2006/customXml" ds:itemID="{0960030E-A287-4C1E-B265-41915E44218D}">
   <ds:schemaRefs>
@@ -11273,22 +11740,6 @@
 </file>
 
 <file path=customXml/itemProps2.xml><?xml version="1.0" encoding="utf-8"?>
-<ds:datastoreItem xmlns:ds="http://schemas.openxmlformats.org/officeDocument/2006/customXml" ds:itemID="{47354831-B878-49B0-A885-06678B2D3932}">
-  <ds:schemaRefs>
-    <ds:schemaRef ds:uri="http://purl.org/dc/elements/1.1/"/>
-    <ds:schemaRef ds:uri="http://schemas.microsoft.com/office/infopath/2007/PartnerControls"/>
-    <ds:schemaRef ds:uri="http://schemas.microsoft.com/office/2006/documentManagement/types"/>
-    <ds:schemaRef ds:uri="http://schemas.openxmlformats.org/package/2006/metadata/core-properties"/>
-    <ds:schemaRef ds:uri="4cc12f37-b467-4376-9c87-c6a2b5099af4"/>
-    <ds:schemaRef ds:uri="http://purl.org/dc/terms/"/>
-    <ds:schemaRef ds:uri="http://schemas.microsoft.com/office/2006/metadata/properties"/>
-    <ds:schemaRef ds:uri="http://www.w3.org/XML/1998/namespace"/>
-    <ds:schemaRef ds:uri="http://purl.org/dc/dcmitype/"/>
-  </ds:schemaRefs>
-</ds:datastoreItem>
-</file>
-
-<file path=customXml/itemProps3.xml><?xml version="1.0" encoding="utf-8"?>
 <ds:datastoreItem xmlns:ds="http://schemas.openxmlformats.org/officeDocument/2006/customXml" ds:itemID="{B2C5E86B-2838-44A9-B603-651237548A2D}">
   <ds:schemaRefs>
     <ds:schemaRef ds:uri="http://schemas.microsoft.com/office/2006/metadata/contentType"/>
@@ -11304,4 +11755,20 @@
     <ds:schemaRef ds:uri="http://schemas.microsoft.com/internal/obd"/>
   </ds:schemaRefs>
 </ds:datastoreItem>
+</file>
+
+<file path=customXml/itemProps3.xml><?xml version="1.0" encoding="utf-8"?>
+<ds:datastoreItem xmlns:ds="http://schemas.openxmlformats.org/officeDocument/2006/customXml" ds:itemID="{47354831-B878-49B0-A885-06678B2D3932}">
+  <ds:schemaRefs>
+    <ds:schemaRef ds:uri="http://purl.org/dc/elements/1.1/"/>
+    <ds:schemaRef ds:uri="http://schemas.microsoft.com/office/infopath/2007/PartnerControls"/>
+    <ds:schemaRef ds:uri="http://schemas.microsoft.com/office/2006/documentManagement/types"/>
+    <ds:schemaRef ds:uri="http://schemas.openxmlformats.org/package/2006/metadata/core-properties"/>
+    <ds:schemaRef ds:uri="4cc12f37-b467-4376-9c87-c6a2b5099af4"/>
+    <ds:schemaRef ds:uri="http://purl.org/dc/terms/"/>
+    <ds:schemaRef ds:uri="http://schemas.microsoft.com/office/2006/metadata/properties"/>
+    <ds:schemaRef ds:uri="http://www.w3.org/XML/1998/namespace"/>
+    <ds:schemaRef ds:uri="http://purl.org/dc/dcmitype/"/>
+  </ds:schemaRefs>
+</ds:datastoreItem>
 </file>
</xml_diff>